<commit_message>
Changed Startup to Program
</commit_message>
<xml_diff>
--- a/2023-SPR/Week05.pptx
+++ b/2023-SPR/Week05.pptx
@@ -270,7 +270,7 @@
           <a:p>
             <a:fld id="{2B1919C7-6BC3-4736-AC32-A62C7B81C82C}" type="datetimeFigureOut">
               <a:rPr lang="en-US" smtClean="0"/>
-              <a:t>2/8/2023</a:t>
+              <a:t>2/9/2023</a:t>
             </a:fld>
             <a:endParaRPr lang="en-US"/>
           </a:p>
@@ -468,7 +468,7 @@
           <a:p>
             <a:fld id="{2B1919C7-6BC3-4736-AC32-A62C7B81C82C}" type="datetimeFigureOut">
               <a:rPr lang="en-US" smtClean="0"/>
-              <a:t>2/8/2023</a:t>
+              <a:t>2/9/2023</a:t>
             </a:fld>
             <a:endParaRPr lang="en-US"/>
           </a:p>
@@ -676,7 +676,7 @@
           <a:p>
             <a:fld id="{2B1919C7-6BC3-4736-AC32-A62C7B81C82C}" type="datetimeFigureOut">
               <a:rPr lang="en-US" smtClean="0"/>
-              <a:t>2/8/2023</a:t>
+              <a:t>2/9/2023</a:t>
             </a:fld>
             <a:endParaRPr lang="en-US"/>
           </a:p>
@@ -874,7 +874,7 @@
           <a:p>
             <a:fld id="{2B1919C7-6BC3-4736-AC32-A62C7B81C82C}" type="datetimeFigureOut">
               <a:rPr lang="en-US" smtClean="0"/>
-              <a:t>2/8/2023</a:t>
+              <a:t>2/9/2023</a:t>
             </a:fld>
             <a:endParaRPr lang="en-US"/>
           </a:p>
@@ -1149,7 +1149,7 @@
           <a:p>
             <a:fld id="{2B1919C7-6BC3-4736-AC32-A62C7B81C82C}" type="datetimeFigureOut">
               <a:rPr lang="en-US" smtClean="0"/>
-              <a:t>2/8/2023</a:t>
+              <a:t>2/9/2023</a:t>
             </a:fld>
             <a:endParaRPr lang="en-US"/>
           </a:p>
@@ -1414,7 +1414,7 @@
           <a:p>
             <a:fld id="{2B1919C7-6BC3-4736-AC32-A62C7B81C82C}" type="datetimeFigureOut">
               <a:rPr lang="en-US" smtClean="0"/>
-              <a:t>2/8/2023</a:t>
+              <a:t>2/9/2023</a:t>
             </a:fld>
             <a:endParaRPr lang="en-US"/>
           </a:p>
@@ -1826,7 +1826,7 @@
           <a:p>
             <a:fld id="{2B1919C7-6BC3-4736-AC32-A62C7B81C82C}" type="datetimeFigureOut">
               <a:rPr lang="en-US" smtClean="0"/>
-              <a:t>2/8/2023</a:t>
+              <a:t>2/9/2023</a:t>
             </a:fld>
             <a:endParaRPr lang="en-US"/>
           </a:p>
@@ -1967,7 +1967,7 @@
           <a:p>
             <a:fld id="{2B1919C7-6BC3-4736-AC32-A62C7B81C82C}" type="datetimeFigureOut">
               <a:rPr lang="en-US" smtClean="0"/>
-              <a:t>2/8/2023</a:t>
+              <a:t>2/9/2023</a:t>
             </a:fld>
             <a:endParaRPr lang="en-US"/>
           </a:p>
@@ -2080,7 +2080,7 @@
           <a:p>
             <a:fld id="{2B1919C7-6BC3-4736-AC32-A62C7B81C82C}" type="datetimeFigureOut">
               <a:rPr lang="en-US" smtClean="0"/>
-              <a:t>2/8/2023</a:t>
+              <a:t>2/9/2023</a:t>
             </a:fld>
             <a:endParaRPr lang="en-US"/>
           </a:p>
@@ -2391,7 +2391,7 @@
           <a:p>
             <a:fld id="{2B1919C7-6BC3-4736-AC32-A62C7B81C82C}" type="datetimeFigureOut">
               <a:rPr lang="en-US" smtClean="0"/>
-              <a:t>2/8/2023</a:t>
+              <a:t>2/9/2023</a:t>
             </a:fld>
             <a:endParaRPr lang="en-US"/>
           </a:p>
@@ -2679,7 +2679,7 @@
           <a:p>
             <a:fld id="{2B1919C7-6BC3-4736-AC32-A62C7B81C82C}" type="datetimeFigureOut">
               <a:rPr lang="en-US" smtClean="0"/>
-              <a:t>2/8/2023</a:t>
+              <a:t>2/9/2023</a:t>
             </a:fld>
             <a:endParaRPr lang="en-US"/>
           </a:p>
@@ -2920,7 +2920,7 @@
           <a:p>
             <a:fld id="{2B1919C7-6BC3-4736-AC32-A62C7B81C82C}" type="datetimeFigureOut">
               <a:rPr lang="en-US" smtClean="0"/>
-              <a:t>2/8/2023</a:t>
+              <a:t>2/9/2023</a:t>
             </a:fld>
             <a:endParaRPr lang="en-US"/>
           </a:p>
@@ -4616,8 +4616,12 @@
               <a:t>Route Attributes: Can override the routing setup in </a:t>
             </a:r>
             <a:r>
+              <a:rPr lang="en-US"/>
+              <a:t>Program.</a:t>
+            </a:r>
+            <a:r>
               <a:rPr lang="en-US" dirty="0" err="1"/>
-              <a:t>Startup.cs</a:t>
+              <a:t>cs</a:t>
             </a:r>
             <a:endParaRPr lang="en-US" dirty="0"/>
           </a:p>

</xml_diff>